<commit_message>
Questions 2.1 à 2.4 complétées
</commit_message>
<xml_diff>
--- a/Annexe.pptx
+++ b/Annexe.pptx
@@ -7,6 +7,8 @@
   <p:sldIdLst>
     <p:sldId id="257" r:id="rId2"/>
     <p:sldId id="258" r:id="rId3"/>
+    <p:sldId id="259" r:id="rId4"/>
+    <p:sldId id="260" r:id="rId5"/>
   </p:sldIdLst>
   <p:sldSz cx="12192000" cy="6858000"/>
   <p:notesSz cx="6858000" cy="9144000"/>
@@ -105,6 +107,11 @@
       </a:defRPr>
     </a:lvl9pPr>
   </p:defaultTextStyle>
+  <p:extLst>
+    <p:ext uri="{EFAFB233-063F-42B5-8137-9DF3F51BA10A}">
+      <p15:sldGuideLst xmlns:p15="http://schemas.microsoft.com/office/powerpoint/2012/main"/>
+    </p:ext>
+  </p:extLst>
 </p:presentation>
 </file>
 
@@ -257,7 +264,7 @@
           <a:p>
             <a:fld id="{A4773B53-96C0-412F-9206-014883FDD824}" type="datetimeFigureOut">
               <a:rPr lang="en-CA" smtClean="0"/>
-              <a:t>2021-12-20</a:t>
+              <a:t>2021-12-21</a:t>
             </a:fld>
             <a:endParaRPr lang="en-CA"/>
           </a:p>
@@ -457,7 +464,7 @@
           <a:p>
             <a:fld id="{A4773B53-96C0-412F-9206-014883FDD824}" type="datetimeFigureOut">
               <a:rPr lang="en-CA" smtClean="0"/>
-              <a:t>2021-12-20</a:t>
+              <a:t>2021-12-21</a:t>
             </a:fld>
             <a:endParaRPr lang="en-CA"/>
           </a:p>
@@ -667,7 +674,7 @@
           <a:p>
             <a:fld id="{A4773B53-96C0-412F-9206-014883FDD824}" type="datetimeFigureOut">
               <a:rPr lang="en-CA" smtClean="0"/>
-              <a:t>2021-12-20</a:t>
+              <a:t>2021-12-21</a:t>
             </a:fld>
             <a:endParaRPr lang="en-CA"/>
           </a:p>
@@ -867,7 +874,7 @@
           <a:p>
             <a:fld id="{A4773B53-96C0-412F-9206-014883FDD824}" type="datetimeFigureOut">
               <a:rPr lang="en-CA" smtClean="0"/>
-              <a:t>2021-12-20</a:t>
+              <a:t>2021-12-21</a:t>
             </a:fld>
             <a:endParaRPr lang="en-CA"/>
           </a:p>
@@ -1143,7 +1150,7 @@
           <a:p>
             <a:fld id="{A4773B53-96C0-412F-9206-014883FDD824}" type="datetimeFigureOut">
               <a:rPr lang="en-CA" smtClean="0"/>
-              <a:t>2021-12-20</a:t>
+              <a:t>2021-12-21</a:t>
             </a:fld>
             <a:endParaRPr lang="en-CA"/>
           </a:p>
@@ -1411,7 +1418,7 @@
           <a:p>
             <a:fld id="{A4773B53-96C0-412F-9206-014883FDD824}" type="datetimeFigureOut">
               <a:rPr lang="en-CA" smtClean="0"/>
-              <a:t>2021-12-20</a:t>
+              <a:t>2021-12-21</a:t>
             </a:fld>
             <a:endParaRPr lang="en-CA"/>
           </a:p>
@@ -1826,7 +1833,7 @@
           <a:p>
             <a:fld id="{A4773B53-96C0-412F-9206-014883FDD824}" type="datetimeFigureOut">
               <a:rPr lang="en-CA" smtClean="0"/>
-              <a:t>2021-12-20</a:t>
+              <a:t>2021-12-21</a:t>
             </a:fld>
             <a:endParaRPr lang="en-CA"/>
           </a:p>
@@ -1968,7 +1975,7 @@
           <a:p>
             <a:fld id="{A4773B53-96C0-412F-9206-014883FDD824}" type="datetimeFigureOut">
               <a:rPr lang="en-CA" smtClean="0"/>
-              <a:t>2021-12-20</a:t>
+              <a:t>2021-12-21</a:t>
             </a:fld>
             <a:endParaRPr lang="en-CA"/>
           </a:p>
@@ -2081,7 +2088,7 @@
           <a:p>
             <a:fld id="{A4773B53-96C0-412F-9206-014883FDD824}" type="datetimeFigureOut">
               <a:rPr lang="en-CA" smtClean="0"/>
-              <a:t>2021-12-20</a:t>
+              <a:t>2021-12-21</a:t>
             </a:fld>
             <a:endParaRPr lang="en-CA"/>
           </a:p>
@@ -2394,7 +2401,7 @@
           <a:p>
             <a:fld id="{A4773B53-96C0-412F-9206-014883FDD824}" type="datetimeFigureOut">
               <a:rPr lang="en-CA" smtClean="0"/>
-              <a:t>2021-12-20</a:t>
+              <a:t>2021-12-21</a:t>
             </a:fld>
             <a:endParaRPr lang="en-CA"/>
           </a:p>
@@ -2683,7 +2690,7 @@
           <a:p>
             <a:fld id="{A4773B53-96C0-412F-9206-014883FDD824}" type="datetimeFigureOut">
               <a:rPr lang="en-CA" smtClean="0"/>
-              <a:t>2021-12-20</a:t>
+              <a:t>2021-12-21</a:t>
             </a:fld>
             <a:endParaRPr lang="en-CA"/>
           </a:p>
@@ -2926,7 +2933,7 @@
           <a:p>
             <a:fld id="{A4773B53-96C0-412F-9206-014883FDD824}" type="datetimeFigureOut">
               <a:rPr lang="en-CA" smtClean="0"/>
-              <a:t>2021-12-20</a:t>
+              <a:t>2021-12-21</a:t>
             </a:fld>
             <a:endParaRPr lang="en-CA"/>
           </a:p>
@@ -3458,6 +3465,418 @@
 </p:sld>
 </file>
 
+<file path=ppt/slides/slide3.xml><?xml version="1.0" encoding="utf-8"?>
+<p:sld xmlns:a="http://schemas.openxmlformats.org/drawingml/2006/main" xmlns:r="http://schemas.openxmlformats.org/officeDocument/2006/relationships" xmlns:p="http://schemas.openxmlformats.org/presentationml/2006/main">
+  <p:cSld>
+    <p:spTree>
+      <p:nvGrpSpPr>
+        <p:cNvPr id="1" name=""/>
+        <p:cNvGrpSpPr/>
+        <p:nvPr/>
+      </p:nvGrpSpPr>
+      <p:grpSpPr>
+        <a:xfrm>
+          <a:off x="0" y="0"/>
+          <a:ext cx="0" cy="0"/>
+          <a:chOff x="0" y="0"/>
+          <a:chExt cx="0" cy="0"/>
+        </a:xfrm>
+      </p:grpSpPr>
+      <p:pic>
+        <p:nvPicPr>
+          <p:cNvPr id="3" name="Picture 2">
+            <a:extLst>
+              <a:ext uri="{FF2B5EF4-FFF2-40B4-BE49-F238E27FC236}">
+                <a16:creationId xmlns:a16="http://schemas.microsoft.com/office/drawing/2014/main" id="{C3DE5347-D070-46F3-9EF7-FC30696BECBD}"/>
+              </a:ext>
+            </a:extLst>
+          </p:cNvPr>
+          <p:cNvPicPr>
+            <a:picLocks noChangeAspect="1"/>
+          </p:cNvPicPr>
+          <p:nvPr/>
+        </p:nvPicPr>
+        <p:blipFill>
+          <a:blip r:embed="rId2"/>
+          <a:stretch>
+            <a:fillRect/>
+          </a:stretch>
+        </p:blipFill>
+        <p:spPr>
+          <a:xfrm>
+            <a:off x="2738511" y="944508"/>
+            <a:ext cx="1647057" cy="4579624"/>
+          </a:xfrm>
+          <a:prstGeom prst="rect">
+            <a:avLst/>
+          </a:prstGeom>
+          <a:ln>
+            <a:solidFill>
+              <a:schemeClr val="tx1"/>
+            </a:solidFill>
+          </a:ln>
+        </p:spPr>
+      </p:pic>
+      <p:pic>
+        <p:nvPicPr>
+          <p:cNvPr id="5" name="Picture 4">
+            <a:extLst>
+              <a:ext uri="{FF2B5EF4-FFF2-40B4-BE49-F238E27FC236}">
+                <a16:creationId xmlns:a16="http://schemas.microsoft.com/office/drawing/2014/main" id="{A3FBB2BB-9224-41F4-BC60-7F1E16FEC6DD}"/>
+              </a:ext>
+            </a:extLst>
+          </p:cNvPr>
+          <p:cNvPicPr>
+            <a:picLocks noChangeAspect="1"/>
+          </p:cNvPicPr>
+          <p:nvPr/>
+        </p:nvPicPr>
+        <p:blipFill>
+          <a:blip r:embed="rId3"/>
+          <a:stretch>
+            <a:fillRect/>
+          </a:stretch>
+        </p:blipFill>
+        <p:spPr>
+          <a:xfrm>
+            <a:off x="4385567" y="937850"/>
+            <a:ext cx="1647057" cy="4586282"/>
+          </a:xfrm>
+          <a:prstGeom prst="rect">
+            <a:avLst/>
+          </a:prstGeom>
+          <a:ln>
+            <a:solidFill>
+              <a:schemeClr val="tx1"/>
+            </a:solidFill>
+          </a:ln>
+        </p:spPr>
+      </p:pic>
+      <p:pic>
+        <p:nvPicPr>
+          <p:cNvPr id="7" name="Picture 6">
+            <a:extLst>
+              <a:ext uri="{FF2B5EF4-FFF2-40B4-BE49-F238E27FC236}">
+                <a16:creationId xmlns:a16="http://schemas.microsoft.com/office/drawing/2014/main" id="{E24CBFB6-9CB7-498F-A700-AE2CAA87ED66}"/>
+              </a:ext>
+            </a:extLst>
+          </p:cNvPr>
+          <p:cNvPicPr>
+            <a:picLocks noChangeAspect="1"/>
+          </p:cNvPicPr>
+          <p:nvPr/>
+        </p:nvPicPr>
+        <p:blipFill>
+          <a:blip r:embed="rId4"/>
+          <a:stretch>
+            <a:fillRect/>
+          </a:stretch>
+        </p:blipFill>
+        <p:spPr>
+          <a:xfrm>
+            <a:off x="6032624" y="944508"/>
+            <a:ext cx="1573616" cy="4579624"/>
+          </a:xfrm>
+          <a:prstGeom prst="rect">
+            <a:avLst/>
+          </a:prstGeom>
+          <a:ln>
+            <a:solidFill>
+              <a:schemeClr val="tx1"/>
+            </a:solidFill>
+          </a:ln>
+        </p:spPr>
+      </p:pic>
+      <p:pic>
+        <p:nvPicPr>
+          <p:cNvPr id="9" name="Picture 8">
+            <a:extLst>
+              <a:ext uri="{FF2B5EF4-FFF2-40B4-BE49-F238E27FC236}">
+                <a16:creationId xmlns:a16="http://schemas.microsoft.com/office/drawing/2014/main" id="{8F3445FB-D2D4-4B35-A57B-181568CA2C56}"/>
+              </a:ext>
+            </a:extLst>
+          </p:cNvPr>
+          <p:cNvPicPr>
+            <a:picLocks noChangeAspect="1"/>
+          </p:cNvPicPr>
+          <p:nvPr/>
+        </p:nvPicPr>
+        <p:blipFill>
+          <a:blip r:embed="rId5"/>
+          <a:stretch>
+            <a:fillRect/>
+          </a:stretch>
+        </p:blipFill>
+        <p:spPr>
+          <a:xfrm>
+            <a:off x="7606240" y="937850"/>
+            <a:ext cx="1506456" cy="4579624"/>
+          </a:xfrm>
+          <a:prstGeom prst="rect">
+            <a:avLst/>
+          </a:prstGeom>
+          <a:ln>
+            <a:solidFill>
+              <a:schemeClr val="tx1"/>
+            </a:solidFill>
+          </a:ln>
+        </p:spPr>
+      </p:pic>
+      <p:sp>
+        <p:nvSpPr>
+          <p:cNvPr id="10" name="TextBox 9">
+            <a:extLst>
+              <a:ext uri="{FF2B5EF4-FFF2-40B4-BE49-F238E27FC236}">
+                <a16:creationId xmlns:a16="http://schemas.microsoft.com/office/drawing/2014/main" id="{34F260F5-7DE8-448B-96DE-3D6C515F0045}"/>
+              </a:ext>
+            </a:extLst>
+          </p:cNvPr>
+          <p:cNvSpPr txBox="1"/>
+          <p:nvPr/>
+        </p:nvSpPr>
+        <p:spPr>
+          <a:xfrm>
+            <a:off x="2734275" y="575176"/>
+            <a:ext cx="6403035" cy="369332"/>
+          </a:xfrm>
+          <a:prstGeom prst="rect">
+            <a:avLst/>
+          </a:prstGeom>
+          <a:noFill/>
+        </p:spPr>
+        <p:txBody>
+          <a:bodyPr wrap="none" rtlCol="0">
+            <a:spAutoFit/>
+          </a:bodyPr>
+          <a:lstStyle/>
+          <a:p>
+            <a:r>
+              <a:rPr lang="fr-CA" b="1" dirty="0"/>
+              <a:t>Risques empiriques de la régression linéaire pour chaque attribut</a:t>
+            </a:r>
+            <a:endParaRPr lang="en-CA" b="1" dirty="0"/>
+          </a:p>
+        </p:txBody>
+      </p:sp>
+    </p:spTree>
+    <p:extLst>
+      <p:ext uri="{BB962C8B-B14F-4D97-AF65-F5344CB8AC3E}">
+        <p14:creationId xmlns:p14="http://schemas.microsoft.com/office/powerpoint/2010/main" val="3802632987"/>
+      </p:ext>
+    </p:extLst>
+  </p:cSld>
+  <p:clrMapOvr>
+    <a:masterClrMapping/>
+  </p:clrMapOvr>
+</p:sld>
+</file>
+
+<file path=ppt/slides/slide4.xml><?xml version="1.0" encoding="utf-8"?>
+<p:sld xmlns:a="http://schemas.openxmlformats.org/drawingml/2006/main" xmlns:r="http://schemas.openxmlformats.org/officeDocument/2006/relationships" xmlns:p="http://schemas.openxmlformats.org/presentationml/2006/main">
+  <p:cSld>
+    <p:spTree>
+      <p:nvGrpSpPr>
+        <p:cNvPr id="1" name=""/>
+        <p:cNvGrpSpPr/>
+        <p:nvPr/>
+      </p:nvGrpSpPr>
+      <p:grpSpPr>
+        <a:xfrm>
+          <a:off x="0" y="0"/>
+          <a:ext cx="0" cy="0"/>
+          <a:chOff x="0" y="0"/>
+          <a:chExt cx="0" cy="0"/>
+        </a:xfrm>
+      </p:grpSpPr>
+      <p:pic>
+        <p:nvPicPr>
+          <p:cNvPr id="3" name="Picture 2">
+            <a:extLst>
+              <a:ext uri="{FF2B5EF4-FFF2-40B4-BE49-F238E27FC236}">
+                <a16:creationId xmlns:a16="http://schemas.microsoft.com/office/drawing/2014/main" id="{3C02767A-E125-4577-9A3F-07572751ABE7}"/>
+              </a:ext>
+            </a:extLst>
+          </p:cNvPr>
+          <p:cNvPicPr>
+            <a:picLocks noChangeAspect="1"/>
+          </p:cNvPicPr>
+          <p:nvPr/>
+        </p:nvPicPr>
+        <p:blipFill>
+          <a:blip r:embed="rId2"/>
+          <a:stretch>
+            <a:fillRect/>
+          </a:stretch>
+        </p:blipFill>
+        <p:spPr>
+          <a:xfrm>
+            <a:off x="2599061" y="957169"/>
+            <a:ext cx="1643349" cy="5249583"/>
+          </a:xfrm>
+          <a:prstGeom prst="rect">
+            <a:avLst/>
+          </a:prstGeom>
+          <a:ln>
+            <a:solidFill>
+              <a:schemeClr val="tx1"/>
+            </a:solidFill>
+          </a:ln>
+        </p:spPr>
+      </p:pic>
+      <p:pic>
+        <p:nvPicPr>
+          <p:cNvPr id="5" name="Picture 4">
+            <a:extLst>
+              <a:ext uri="{FF2B5EF4-FFF2-40B4-BE49-F238E27FC236}">
+                <a16:creationId xmlns:a16="http://schemas.microsoft.com/office/drawing/2014/main" id="{01565D63-8660-4B74-B516-F6D5EE9803C2}"/>
+              </a:ext>
+            </a:extLst>
+          </p:cNvPr>
+          <p:cNvPicPr>
+            <a:picLocks noChangeAspect="1"/>
+          </p:cNvPicPr>
+          <p:nvPr/>
+        </p:nvPicPr>
+        <p:blipFill>
+          <a:blip r:embed="rId3"/>
+          <a:stretch>
+            <a:fillRect/>
+          </a:stretch>
+        </p:blipFill>
+        <p:spPr>
+          <a:xfrm>
+            <a:off x="4242410" y="957169"/>
+            <a:ext cx="1742119" cy="5249583"/>
+          </a:xfrm>
+          <a:prstGeom prst="rect">
+            <a:avLst/>
+          </a:prstGeom>
+          <a:ln>
+            <a:solidFill>
+              <a:schemeClr val="tx1"/>
+            </a:solidFill>
+          </a:ln>
+        </p:spPr>
+      </p:pic>
+      <p:pic>
+        <p:nvPicPr>
+          <p:cNvPr id="7" name="Picture 6">
+            <a:extLst>
+              <a:ext uri="{FF2B5EF4-FFF2-40B4-BE49-F238E27FC236}">
+                <a16:creationId xmlns:a16="http://schemas.microsoft.com/office/drawing/2014/main" id="{F530951E-FB33-4B30-85B1-D290F7E50AB7}"/>
+              </a:ext>
+            </a:extLst>
+          </p:cNvPr>
+          <p:cNvPicPr>
+            <a:picLocks noChangeAspect="1"/>
+          </p:cNvPicPr>
+          <p:nvPr/>
+        </p:nvPicPr>
+        <p:blipFill>
+          <a:blip r:embed="rId4"/>
+          <a:stretch>
+            <a:fillRect/>
+          </a:stretch>
+        </p:blipFill>
+        <p:spPr>
+          <a:xfrm>
+            <a:off x="5984529" y="957168"/>
+            <a:ext cx="1643348" cy="5249583"/>
+          </a:xfrm>
+          <a:prstGeom prst="rect">
+            <a:avLst/>
+          </a:prstGeom>
+          <a:ln>
+            <a:solidFill>
+              <a:schemeClr val="tx1"/>
+            </a:solidFill>
+          </a:ln>
+        </p:spPr>
+      </p:pic>
+      <p:pic>
+        <p:nvPicPr>
+          <p:cNvPr id="9" name="Picture 8">
+            <a:extLst>
+              <a:ext uri="{FF2B5EF4-FFF2-40B4-BE49-F238E27FC236}">
+                <a16:creationId xmlns:a16="http://schemas.microsoft.com/office/drawing/2014/main" id="{7F5B499F-F21D-42B6-9DD5-A73C0AAE6BF8}"/>
+              </a:ext>
+            </a:extLst>
+          </p:cNvPr>
+          <p:cNvPicPr>
+            <a:picLocks noChangeAspect="1"/>
+          </p:cNvPicPr>
+          <p:nvPr/>
+        </p:nvPicPr>
+        <p:blipFill>
+          <a:blip r:embed="rId5"/>
+          <a:stretch>
+            <a:fillRect/>
+          </a:stretch>
+        </p:blipFill>
+        <p:spPr>
+          <a:xfrm>
+            <a:off x="7627876" y="957167"/>
+            <a:ext cx="1572561" cy="5249583"/>
+          </a:xfrm>
+          <a:prstGeom prst="rect">
+            <a:avLst/>
+          </a:prstGeom>
+          <a:ln>
+            <a:solidFill>
+              <a:schemeClr val="tx1"/>
+            </a:solidFill>
+          </a:ln>
+        </p:spPr>
+      </p:pic>
+      <p:sp>
+        <p:nvSpPr>
+          <p:cNvPr id="10" name="TextBox 9">
+            <a:extLst>
+              <a:ext uri="{FF2B5EF4-FFF2-40B4-BE49-F238E27FC236}">
+                <a16:creationId xmlns:a16="http://schemas.microsoft.com/office/drawing/2014/main" id="{04368E0D-5853-40CC-951F-DCC223A20515}"/>
+              </a:ext>
+            </a:extLst>
+          </p:cNvPr>
+          <p:cNvSpPr txBox="1"/>
+          <p:nvPr/>
+        </p:nvSpPr>
+        <p:spPr>
+          <a:xfrm>
+            <a:off x="2734275" y="575176"/>
+            <a:ext cx="6285375" cy="369332"/>
+          </a:xfrm>
+          <a:prstGeom prst="rect">
+            <a:avLst/>
+          </a:prstGeom>
+          <a:noFill/>
+        </p:spPr>
+        <p:txBody>
+          <a:bodyPr wrap="none" rtlCol="0">
+            <a:spAutoFit/>
+          </a:bodyPr>
+          <a:lstStyle/>
+          <a:p>
+            <a:r>
+              <a:rPr lang="fr-CA" b="1" dirty="0"/>
+              <a:t>Risques empiriques du classifieur bayésien pour chaque attribut</a:t>
+            </a:r>
+            <a:endParaRPr lang="en-CA" b="1" dirty="0"/>
+          </a:p>
+        </p:txBody>
+      </p:sp>
+    </p:spTree>
+    <p:extLst>
+      <p:ext uri="{BB962C8B-B14F-4D97-AF65-F5344CB8AC3E}">
+        <p14:creationId xmlns:p14="http://schemas.microsoft.com/office/powerpoint/2010/main" val="2750254552"/>
+      </p:ext>
+    </p:extLst>
+  </p:cSld>
+  <p:clrMapOvr>
+    <a:masterClrMapping/>
+  </p:clrMapOvr>
+</p:sld>
+</file>
+
 <file path=ppt/theme/theme1.xml><?xml version="1.0" encoding="utf-8"?>
 <a:theme xmlns:a="http://schemas.openxmlformats.org/drawingml/2006/main" name="Office Theme">
   <a:themeElements>

</xml_diff>